<commit_message>
add: add project note
</commit_message>
<xml_diff>
--- a/Project/Question-PDD.pptx
+++ b/Project/Question-PDD.pptx
@@ -312,7 +312,7 @@
                 <a:latin typeface="Arial" panose="020B0604020202020204" pitchFamily="34" charset="0"/>
                 <a:cs typeface="Arial" panose="020B0604020202020204" pitchFamily="34" charset="0"/>
               </a:rPr>
-              <a:t>3/7/25</a:t>
+              <a:t>4/7/25</a:t>
             </a:fld>
             <a:endParaRPr lang="en-US">
               <a:latin typeface="Arial" panose="020B0604020202020204" pitchFamily="34" charset="0"/>
@@ -495,7 +495,7 @@
           <a:p>
             <a:fld id="{732C4D34-2C19-43C3-91CC-9F2B4AC12977}" type="datetimeFigureOut">
               <a:rPr lang="en-US" smtClean="0"/>
-              <a:t>3/7/25</a:t>
+              <a:t>4/7/25</a:t>
             </a:fld>
             <a:endParaRPr lang="en-US"/>
           </a:p>
@@ -800,7 +800,7 @@
           <a:graphicData uri="http://schemas.openxmlformats.org/presentationml/2006/ole">
             <mc:AlternateContent xmlns:mc="http://schemas.openxmlformats.org/markup-compatibility/2006">
               <mc:Choice xmlns:v="urn:schemas-microsoft-com:vml" Requires="v">
-                <p:oleObj spid="_x0000_s2418" name="think-cell Slide" r:id="rId4" imgW="7620" imgH="7620" progId="TCLayout.ActiveDocument.1">
+                <p:oleObj spid="_x0000_s2419" name="think-cell Slide" r:id="rId4" imgW="7620" imgH="7620" progId="TCLayout.ActiveDocument.1">
                   <p:embed/>
                 </p:oleObj>
               </mc:Choice>
@@ -1355,7 +1355,7 @@
           <a:graphicData uri="http://schemas.openxmlformats.org/presentationml/2006/ole">
             <mc:AlternateContent xmlns:mc="http://schemas.openxmlformats.org/markup-compatibility/2006">
               <mc:Choice xmlns:v="urn:schemas-microsoft-com:vml" Requires="v">
-                <p:oleObj spid="_x0000_s16553" name="think-cell Slide" r:id="rId4" imgW="7620" imgH="7620" progId="TCLayout.ActiveDocument.1">
+                <p:oleObj spid="_x0000_s16554" name="think-cell Slide" r:id="rId4" imgW="7620" imgH="7620" progId="TCLayout.ActiveDocument.1">
                   <p:embed/>
                 </p:oleObj>
               </mc:Choice>
@@ -1531,7 +1531,7 @@
           <a:graphicData uri="http://schemas.openxmlformats.org/presentationml/2006/ole">
             <mc:AlternateContent xmlns:mc="http://schemas.openxmlformats.org/markup-compatibility/2006">
               <mc:Choice xmlns:v="urn:schemas-microsoft-com:vml" Requires="v">
-                <p:oleObj spid="_x0000_s18600" name="think-cell Slide" r:id="rId4" imgW="7620" imgH="7620" progId="TCLayout.ActiveDocument.1">
+                <p:oleObj spid="_x0000_s18601" name="think-cell Slide" r:id="rId4" imgW="7620" imgH="7620" progId="TCLayout.ActiveDocument.1">
                   <p:embed/>
                 </p:oleObj>
               </mc:Choice>
@@ -1853,7 +1853,7 @@
           <a:graphicData uri="http://schemas.openxmlformats.org/presentationml/2006/ole">
             <mc:AlternateContent xmlns:mc="http://schemas.openxmlformats.org/markup-compatibility/2006">
               <mc:Choice xmlns:v="urn:schemas-microsoft-com:vml" Requires="v">
-                <p:oleObj spid="_x0000_s19624" name="think-cell Slide" r:id="rId4" imgW="7620" imgH="7620" progId="TCLayout.ActiveDocument.1">
+                <p:oleObj spid="_x0000_s19625" name="think-cell Slide" r:id="rId4" imgW="7620" imgH="7620" progId="TCLayout.ActiveDocument.1">
                   <p:embed/>
                 </p:oleObj>
               </mc:Choice>
@@ -2375,7 +2375,7 @@
           <a:graphicData uri="http://schemas.openxmlformats.org/presentationml/2006/ole">
             <mc:AlternateContent xmlns:mc="http://schemas.openxmlformats.org/markup-compatibility/2006">
               <mc:Choice xmlns:v="urn:schemas-microsoft-com:vml" Requires="v">
-                <p:oleObj spid="_x0000_s20648" name="think-cell Slide" r:id="rId4" imgW="7620" imgH="7620" progId="TCLayout.ActiveDocument.1">
+                <p:oleObj spid="_x0000_s20649" name="think-cell Slide" r:id="rId4" imgW="7620" imgH="7620" progId="TCLayout.ActiveDocument.1">
                   <p:embed/>
                 </p:oleObj>
               </mc:Choice>
@@ -2559,7 +2559,7 @@
           <a:graphicData uri="http://schemas.openxmlformats.org/presentationml/2006/ole">
             <mc:AlternateContent xmlns:mc="http://schemas.openxmlformats.org/markup-compatibility/2006">
               <mc:Choice xmlns:v="urn:schemas-microsoft-com:vml" Requires="v">
-                <p:oleObj spid="_x0000_s1394" name="think-cell Slide" r:id="rId9" imgW="12700" imgH="12700" progId="TCLayout.ActiveDocument.1">
+                <p:oleObj spid="_x0000_s1395" name="think-cell Slide" r:id="rId9" imgW="12700" imgH="12700" progId="TCLayout.ActiveDocument.1">
                   <p:embed/>
                 </p:oleObj>
               </mc:Choice>
@@ -3335,7 +3335,7 @@
           <a:graphicData uri="http://schemas.openxmlformats.org/presentationml/2006/ole">
             <mc:AlternateContent xmlns:mc="http://schemas.openxmlformats.org/markup-compatibility/2006">
               <mc:Choice xmlns:v="urn:schemas-microsoft-com:vml" Requires="v">
-                <p:oleObj spid="_x0000_s15580" name="think-cell Slide" r:id="rId4" imgW="7620" imgH="7620" progId="TCLayout.ActiveDocument.1">
+                <p:oleObj spid="_x0000_s15581" name="think-cell Slide" r:id="rId4" imgW="7620" imgH="7620" progId="TCLayout.ActiveDocument.1">
                   <p:embed/>
                 </p:oleObj>
               </mc:Choice>
@@ -6271,7 +6271,7 @@
           <a:graphicData uri="http://schemas.openxmlformats.org/presentationml/2006/ole">
             <mc:AlternateContent xmlns:mc="http://schemas.openxmlformats.org/markup-compatibility/2006">
               <mc:Choice xmlns:v="urn:schemas-microsoft-com:vml" Requires="v">
-                <p:oleObj spid="_x0000_s17577" name="think-cell Slide" r:id="rId4" imgW="7620" imgH="7620" progId="TCLayout.ActiveDocument.1">
+                <p:oleObj spid="_x0000_s17578" name="think-cell Slide" r:id="rId4" imgW="7620" imgH="7620" progId="TCLayout.ActiveDocument.1">
                   <p:embed/>
                 </p:oleObj>
               </mc:Choice>

</xml_diff>

<commit_message>
add: add pdd project draft (#1)
</commit_message>
<xml_diff>
--- a/Project/Question-PDD.pptx
+++ b/Project/Question-PDD.pptx
@@ -312,7 +312,7 @@
                 <a:latin typeface="Arial" panose="020B0604020202020204" pitchFamily="34" charset="0"/>
                 <a:cs typeface="Arial" panose="020B0604020202020204" pitchFamily="34" charset="0"/>
               </a:rPr>
-              <a:t>4/7/25</a:t>
+              <a:t>4/15/25</a:t>
             </a:fld>
             <a:endParaRPr lang="en-US">
               <a:latin typeface="Arial" panose="020B0604020202020204" pitchFamily="34" charset="0"/>
@@ -495,7 +495,7 @@
           <a:p>
             <a:fld id="{732C4D34-2C19-43C3-91CC-9F2B4AC12977}" type="datetimeFigureOut">
               <a:rPr lang="en-US" smtClean="0"/>
-              <a:t>4/7/25</a:t>
+              <a:t>4/15/25</a:t>
             </a:fld>
             <a:endParaRPr lang="en-US"/>
           </a:p>
@@ -800,7 +800,7 @@
           <a:graphicData uri="http://schemas.openxmlformats.org/presentationml/2006/ole">
             <mc:AlternateContent xmlns:mc="http://schemas.openxmlformats.org/markup-compatibility/2006">
               <mc:Choice xmlns:v="urn:schemas-microsoft-com:vml" Requires="v">
-                <p:oleObj spid="_x0000_s2419" name="think-cell Slide" r:id="rId4" imgW="7620" imgH="7620" progId="TCLayout.ActiveDocument.1">
+                <p:oleObj spid="_x0000_s2420" name="think-cell Slide" r:id="rId4" imgW="7620" imgH="7620" progId="TCLayout.ActiveDocument.1">
                   <p:embed/>
                 </p:oleObj>
               </mc:Choice>
@@ -1355,7 +1355,7 @@
           <a:graphicData uri="http://schemas.openxmlformats.org/presentationml/2006/ole">
             <mc:AlternateContent xmlns:mc="http://schemas.openxmlformats.org/markup-compatibility/2006">
               <mc:Choice xmlns:v="urn:schemas-microsoft-com:vml" Requires="v">
-                <p:oleObj spid="_x0000_s16554" name="think-cell Slide" r:id="rId4" imgW="7620" imgH="7620" progId="TCLayout.ActiveDocument.1">
+                <p:oleObj spid="_x0000_s16555" name="think-cell Slide" r:id="rId4" imgW="7620" imgH="7620" progId="TCLayout.ActiveDocument.1">
                   <p:embed/>
                 </p:oleObj>
               </mc:Choice>
@@ -1531,7 +1531,7 @@
           <a:graphicData uri="http://schemas.openxmlformats.org/presentationml/2006/ole">
             <mc:AlternateContent xmlns:mc="http://schemas.openxmlformats.org/markup-compatibility/2006">
               <mc:Choice xmlns:v="urn:schemas-microsoft-com:vml" Requires="v">
-                <p:oleObj spid="_x0000_s18601" name="think-cell Slide" r:id="rId4" imgW="7620" imgH="7620" progId="TCLayout.ActiveDocument.1">
+                <p:oleObj spid="_x0000_s18602" name="think-cell Slide" r:id="rId4" imgW="7620" imgH="7620" progId="TCLayout.ActiveDocument.1">
                   <p:embed/>
                 </p:oleObj>
               </mc:Choice>
@@ -1853,7 +1853,7 @@
           <a:graphicData uri="http://schemas.openxmlformats.org/presentationml/2006/ole">
             <mc:AlternateContent xmlns:mc="http://schemas.openxmlformats.org/markup-compatibility/2006">
               <mc:Choice xmlns:v="urn:schemas-microsoft-com:vml" Requires="v">
-                <p:oleObj spid="_x0000_s19625" name="think-cell Slide" r:id="rId4" imgW="7620" imgH="7620" progId="TCLayout.ActiveDocument.1">
+                <p:oleObj spid="_x0000_s19626" name="think-cell Slide" r:id="rId4" imgW="7620" imgH="7620" progId="TCLayout.ActiveDocument.1">
                   <p:embed/>
                 </p:oleObj>
               </mc:Choice>
@@ -2375,7 +2375,7 @@
           <a:graphicData uri="http://schemas.openxmlformats.org/presentationml/2006/ole">
             <mc:AlternateContent xmlns:mc="http://schemas.openxmlformats.org/markup-compatibility/2006">
               <mc:Choice xmlns:v="urn:schemas-microsoft-com:vml" Requires="v">
-                <p:oleObj spid="_x0000_s20649" name="think-cell Slide" r:id="rId4" imgW="7620" imgH="7620" progId="TCLayout.ActiveDocument.1">
+                <p:oleObj spid="_x0000_s20650" name="think-cell Slide" r:id="rId4" imgW="7620" imgH="7620" progId="TCLayout.ActiveDocument.1">
                   <p:embed/>
                 </p:oleObj>
               </mc:Choice>
@@ -2559,7 +2559,7 @@
           <a:graphicData uri="http://schemas.openxmlformats.org/presentationml/2006/ole">
             <mc:AlternateContent xmlns:mc="http://schemas.openxmlformats.org/markup-compatibility/2006">
               <mc:Choice xmlns:v="urn:schemas-microsoft-com:vml" Requires="v">
-                <p:oleObj spid="_x0000_s1395" name="think-cell Slide" r:id="rId9" imgW="12700" imgH="12700" progId="TCLayout.ActiveDocument.1">
+                <p:oleObj spid="_x0000_s1396" name="think-cell Slide" r:id="rId9" imgW="12700" imgH="12700" progId="TCLayout.ActiveDocument.1">
                   <p:embed/>
                 </p:oleObj>
               </mc:Choice>
@@ -3335,7 +3335,7 @@
           <a:graphicData uri="http://schemas.openxmlformats.org/presentationml/2006/ole">
             <mc:AlternateContent xmlns:mc="http://schemas.openxmlformats.org/markup-compatibility/2006">
               <mc:Choice xmlns:v="urn:schemas-microsoft-com:vml" Requires="v">
-                <p:oleObj spid="_x0000_s15581" name="think-cell Slide" r:id="rId4" imgW="7620" imgH="7620" progId="TCLayout.ActiveDocument.1">
+                <p:oleObj spid="_x0000_s15582" name="think-cell Slide" r:id="rId4" imgW="7620" imgH="7620" progId="TCLayout.ActiveDocument.1">
                   <p:embed/>
                 </p:oleObj>
               </mc:Choice>
@@ -6271,7 +6271,7 @@
           <a:graphicData uri="http://schemas.openxmlformats.org/presentationml/2006/ole">
             <mc:AlternateContent xmlns:mc="http://schemas.openxmlformats.org/markup-compatibility/2006">
               <mc:Choice xmlns:v="urn:schemas-microsoft-com:vml" Requires="v">
-                <p:oleObj spid="_x0000_s17578" name="think-cell Slide" r:id="rId4" imgW="7620" imgH="7620" progId="TCLayout.ActiveDocument.1">
+                <p:oleObj spid="_x0000_s17579" name="think-cell Slide" r:id="rId4" imgW="7620" imgH="7620" progId="TCLayout.ActiveDocument.1">
                   <p:embed/>
                 </p:oleObj>
               </mc:Choice>

</xml_diff>